<commit_message>
new model and finished presentation
</commit_message>
<xml_diff>
--- a/Disaster_Tweets_Presentation.pptx
+++ b/Disaster_Tweets_Presentation.pptx
@@ -19421,6 +19421,78 @@
           </a:p>
         </p:txBody>
       </p:sp>
+      <p:pic>
+        <p:nvPicPr>
+          <p:cNvPr id="3" name="Picture 2"/>
+          <p:cNvPicPr>
+            <a:picLocks noChangeAspect="1"/>
+          </p:cNvPicPr>
+          <p:nvPr/>
+        </p:nvPicPr>
+        <p:blipFill>
+          <a:blip r:embed="rId2"/>
+          <a:stretch>
+            <a:fillRect/>
+          </a:stretch>
+        </p:blipFill>
+        <p:spPr>
+          <a:xfrm>
+            <a:off x="913593" y="1929179"/>
+            <a:ext cx="4762500" cy="1609725"/>
+          </a:xfrm>
+          <a:prstGeom prst="rect">
+            <a:avLst/>
+          </a:prstGeom>
+        </p:spPr>
+      </p:pic>
+      <p:pic>
+        <p:nvPicPr>
+          <p:cNvPr id="4" name="Picture 3"/>
+          <p:cNvPicPr>
+            <a:picLocks noChangeAspect="1"/>
+          </p:cNvPicPr>
+          <p:nvPr/>
+        </p:nvPicPr>
+        <p:blipFill>
+          <a:blip r:embed="rId3"/>
+          <a:stretch>
+            <a:fillRect/>
+          </a:stretch>
+        </p:blipFill>
+        <p:spPr>
+          <a:xfrm>
+            <a:off x="913593" y="3538904"/>
+            <a:ext cx="4800600" cy="2686050"/>
+          </a:xfrm>
+          <a:prstGeom prst="rect">
+            <a:avLst/>
+          </a:prstGeom>
+        </p:spPr>
+      </p:pic>
+      <p:pic>
+        <p:nvPicPr>
+          <p:cNvPr id="5" name="Picture 4"/>
+          <p:cNvPicPr>
+            <a:picLocks noChangeAspect="1"/>
+          </p:cNvPicPr>
+          <p:nvPr/>
+        </p:nvPicPr>
+        <p:blipFill>
+          <a:blip r:embed="rId4"/>
+          <a:stretch>
+            <a:fillRect/>
+          </a:stretch>
+        </p:blipFill>
+        <p:spPr>
+          <a:xfrm>
+            <a:off x="5676093" y="1929179"/>
+            <a:ext cx="5676900" cy="1676400"/>
+          </a:xfrm>
+          <a:prstGeom prst="rect">
+            <a:avLst/>
+          </a:prstGeom>
+        </p:spPr>
+      </p:pic>
     </p:spTree>
     <p:extLst>
       <p:ext uri="{BB962C8B-B14F-4D97-AF65-F5344CB8AC3E}">
@@ -19790,15 +19862,7 @@
             </a:pPr>
             <a:r>
               <a:rPr lang="en-US" sz="3200" dirty="0" smtClean="0"/>
-              <a:t>Disasters encompasses </a:t>
-            </a:r>
-            <a:r>
-              <a:rPr lang="en-US" sz="3200" smtClean="0"/>
-              <a:t>non-natural occurrences </a:t>
-            </a:r>
-            <a:r>
-              <a:rPr lang="en-US" sz="3200" dirty="0" smtClean="0"/>
-              <a:t>as well</a:t>
+              <a:t>Disasters encompasses non-natural occurrences as well</a:t>
             </a:r>
             <a:endParaRPr sz="2000" dirty="0"/>
           </a:p>
@@ -19819,7 +19883,7 @@
         </p:blipFill>
         <p:spPr>
           <a:xfrm>
-            <a:off x="745596" y="4530097"/>
+            <a:off x="1783089" y="4530097"/>
             <a:ext cx="2209800" cy="914400"/>
           </a:xfrm>
           <a:prstGeom prst="rect">
@@ -19853,8 +19917,68 @@
         </p:blipFill>
         <p:spPr>
           <a:xfrm>
-            <a:off x="5099034" y="4034797"/>
+            <a:off x="1850496" y="3120397"/>
             <a:ext cx="1943100" cy="1409700"/>
+          </a:xfrm>
+          <a:prstGeom prst="rect">
+            <a:avLst/>
+          </a:prstGeom>
+        </p:spPr>
+      </p:pic>
+      <p:pic>
+        <p:nvPicPr>
+          <p:cNvPr id="3" name="Picture 2"/>
+          <p:cNvPicPr>
+            <a:picLocks noChangeAspect="1"/>
+          </p:cNvPicPr>
+          <p:nvPr/>
+        </p:nvPicPr>
+        <p:blipFill>
+          <a:blip r:embed="rId6">
+            <a:extLst>
+              <a:ext uri="{28A0092B-C50C-407E-A947-70E740481C1C}">
+                <a14:useLocalDpi xmlns:a14="http://schemas.microsoft.com/office/drawing/2010/main" val="0"/>
+              </a:ext>
+            </a:extLst>
+          </a:blip>
+          <a:stretch>
+            <a:fillRect/>
+          </a:stretch>
+        </p:blipFill>
+        <p:spPr>
+          <a:xfrm>
+            <a:off x="4422531" y="3120397"/>
+            <a:ext cx="3781569" cy="2857866"/>
+          </a:xfrm>
+          <a:prstGeom prst="rect">
+            <a:avLst/>
+          </a:prstGeom>
+        </p:spPr>
+      </p:pic>
+      <p:pic>
+        <p:nvPicPr>
+          <p:cNvPr id="4" name="Picture 3"/>
+          <p:cNvPicPr>
+            <a:picLocks noChangeAspect="1"/>
+          </p:cNvPicPr>
+          <p:nvPr/>
+        </p:nvPicPr>
+        <p:blipFill>
+          <a:blip r:embed="rId7">
+            <a:extLst>
+              <a:ext uri="{28A0092B-C50C-407E-A947-70E740481C1C}">
+                <a14:useLocalDpi xmlns:a14="http://schemas.microsoft.com/office/drawing/2010/main" val="0"/>
+              </a:ext>
+            </a:extLst>
+          </a:blip>
+          <a:stretch>
+            <a:fillRect/>
+          </a:stretch>
+        </p:blipFill>
+        <p:spPr>
+          <a:xfrm>
+            <a:off x="8833035" y="2941840"/>
+            <a:ext cx="1832034" cy="3794045"/>
           </a:xfrm>
           <a:prstGeom prst="rect">
             <a:avLst/>
@@ -20279,7 +20403,7 @@
             </a:pPr>
             <a:r>
               <a:rPr lang="en-US" sz="3200" dirty="0" smtClean="0"/>
-              <a:t>Naïve Bayes was our most successful model with a 77.24% accuracy</a:t>
+              <a:t>Naïve Bayes was our most successful model with a 77.41% accuracy</a:t>
             </a:r>
           </a:p>
           <a:p>

</xml_diff>

<commit_message>
updated acc in presentation
</commit_message>
<xml_diff>
--- a/Disaster_Tweets_Presentation.pptx
+++ b/Disaster_Tweets_Presentation.pptx
@@ -20460,19 +20460,27 @@
           </a:bodyPr>
           <a:lstStyle/>
           <a:p>
-            <a:pPr marL="342900" lvl="0" indent="-342900" algn="l" rtl="0">
-              <a:spcBef>
-                <a:spcPts val="0"/>
-              </a:spcBef>
-              <a:spcAft>
-                <a:spcPts val="0"/>
-              </a:spcAft>
+            <a:pPr marL="342900" lvl="0">
+              <a:spcBef>
+                <a:spcPts val="0"/>
+              </a:spcBef>
               <a:buSzPts val="2200"/>
-              <a:buChar char="🠶"/>
             </a:pPr>
             <a:r>
               <a:rPr lang="en-US" sz="3200" dirty="0" smtClean="0"/>
-              <a:t>Naïve Bayes was our most successful model with a 77.41% accuracy</a:t>
+              <a:t>Naïve Bayes was our most successful model with </a:t>
+            </a:r>
+            <a:r>
+              <a:rPr lang="en-US" sz="3200" smtClean="0"/>
+              <a:t>a </a:t>
+            </a:r>
+            <a:r>
+              <a:rPr lang="en-US" sz="3200" smtClean="0"/>
+              <a:t>80.11% </a:t>
+            </a:r>
+            <a:r>
+              <a:rPr lang="en-US" sz="3200" dirty="0" smtClean="0"/>
+              <a:t>accuracy</a:t>
             </a:r>
           </a:p>
           <a:p>

</xml_diff>